<commit_message>
add web v3.0 dashboard
</commit_message>
<xml_diff>
--- a/doc/struct.pptx
+++ b/doc/struct.pptx
@@ -6,6 +6,7 @@
   </p:sldMasterIdLst>
   <p:sldIdLst>
     <p:sldId id="256" r:id="rId3"/>
+    <p:sldId id="257" r:id="rId4"/>
   </p:sldIdLst>
   <p:sldSz cx="12192000" cy="6858000"/>
   <p:notesSz cx="7103745" cy="10234295"/>
@@ -2711,6 +2712,1091 @@
       </p:sp>
       <p:sp>
         <p:nvSpPr>
+          <p:cNvPr id="10" name="圆角矩形 9"/>
+          <p:cNvSpPr/>
+          <p:nvPr/>
+        </p:nvSpPr>
+        <p:spPr>
+          <a:xfrm>
+            <a:off x="5485130" y="2482850"/>
+            <a:ext cx="2795905" cy="716915"/>
+          </a:xfrm>
+          <a:prstGeom prst="roundRect">
+            <a:avLst/>
+          </a:prstGeom>
+          <a:pattFill prst="dotDmnd">
+            <a:fgClr>
+              <a:schemeClr val="accent1"/>
+            </a:fgClr>
+            <a:bgClr>
+              <a:schemeClr val="bg1"/>
+            </a:bgClr>
+          </a:pattFill>
+          <a:ln>
+            <a:solidFill>
+              <a:schemeClr val="accent1"/>
+            </a:solidFill>
+          </a:ln>
+        </p:spPr>
+        <p:style>
+          <a:lnRef idx="2">
+            <a:schemeClr val="accent6"/>
+          </a:lnRef>
+          <a:fillRef idx="1">
+            <a:schemeClr val="lt1"/>
+          </a:fillRef>
+          <a:effectRef idx="0">
+            <a:schemeClr val="accent6"/>
+          </a:effectRef>
+          <a:fontRef idx="minor">
+            <a:schemeClr val="dk1"/>
+          </a:fontRef>
+        </p:style>
+        <p:txBody>
+          <a:bodyPr rtlCol="0" anchor="ctr"/>
+          <a:p>
+            <a:pPr algn="ctr"/>
+            <a:endParaRPr lang="zh-CN" altLang="en-US"/>
+          </a:p>
+        </p:txBody>
+      </p:sp>
+      <p:sp>
+        <p:nvSpPr>
+          <p:cNvPr id="12" name="圆角矩形 11"/>
+          <p:cNvSpPr/>
+          <p:nvPr/>
+        </p:nvSpPr>
+        <p:spPr>
+          <a:xfrm>
+            <a:off x="3126105" y="5050790"/>
+            <a:ext cx="1471930" cy="553720"/>
+          </a:xfrm>
+          <a:prstGeom prst="roundRect">
+            <a:avLst/>
+          </a:prstGeom>
+          <a:noFill/>
+          <a:ln>
+            <a:solidFill>
+              <a:schemeClr val="accent1"/>
+            </a:solidFill>
+          </a:ln>
+        </p:spPr>
+        <p:style>
+          <a:lnRef idx="2">
+            <a:schemeClr val="accent6"/>
+          </a:lnRef>
+          <a:fillRef idx="1">
+            <a:schemeClr val="lt1"/>
+          </a:fillRef>
+          <a:effectRef idx="0">
+            <a:schemeClr val="accent6"/>
+          </a:effectRef>
+          <a:fontRef idx="minor">
+            <a:schemeClr val="dk1"/>
+          </a:fontRef>
+        </p:style>
+        <p:txBody>
+          <a:bodyPr rtlCol="0" anchor="ctr"/>
+          <a:p>
+            <a:pPr algn="ctr"/>
+            <a:endParaRPr lang="zh-CN" altLang="en-US"/>
+          </a:p>
+        </p:txBody>
+      </p:sp>
+      <p:sp>
+        <p:nvSpPr>
+          <p:cNvPr id="14" name="文本框 13"/>
+          <p:cNvSpPr txBox="1"/>
+          <p:nvPr/>
+        </p:nvSpPr>
+        <p:spPr>
+          <a:xfrm>
+            <a:off x="1666240" y="2131695"/>
+            <a:ext cx="792480" cy="368300"/>
+          </a:xfrm>
+          <a:prstGeom prst="rect">
+            <a:avLst/>
+          </a:prstGeom>
+          <a:noFill/>
+        </p:spPr>
+        <p:txBody>
+          <a:bodyPr wrap="none" rtlCol="0">
+            <a:spAutoFit/>
+          </a:bodyPr>
+          <a:p>
+            <a:r>
+              <a:rPr lang="en-US" altLang="zh-CN"/>
+              <a:t>mysql</a:t>
+            </a:r>
+            <a:endParaRPr lang="en-US" altLang="zh-CN"/>
+          </a:p>
+        </p:txBody>
+      </p:sp>
+      <p:sp>
+        <p:nvSpPr>
+          <p:cNvPr id="15" name="流程图: 磁盘 14"/>
+          <p:cNvSpPr/>
+          <p:nvPr/>
+        </p:nvSpPr>
+        <p:spPr>
+          <a:xfrm>
+            <a:off x="1605280" y="3054350"/>
+            <a:ext cx="914400" cy="611505"/>
+          </a:xfrm>
+          <a:prstGeom prst="flowChartMagneticDisk">
+            <a:avLst/>
+          </a:prstGeom>
+          <a:noFill/>
+          <a:extLst>
+            <a:ext uri="{909E8E84-426E-40DD-AFC4-6F175D3DCCD1}">
+              <a14:hiddenFill xmlns:a14="http://schemas.microsoft.com/office/drawing/2010/main">
+                <a:solidFill>
+                  <a:schemeClr val="accent1"/>
+                </a:solidFill>
+              </a14:hiddenFill>
+            </a:ext>
+          </a:extLst>
+        </p:spPr>
+        <p:style>
+          <a:lnRef idx="2">
+            <a:schemeClr val="accent1">
+              <a:shade val="50000"/>
+            </a:schemeClr>
+          </a:lnRef>
+          <a:fillRef idx="1">
+            <a:schemeClr val="accent1"/>
+          </a:fillRef>
+          <a:effectRef idx="0">
+            <a:schemeClr val="accent1"/>
+          </a:effectRef>
+          <a:fontRef idx="minor">
+            <a:schemeClr val="lt1"/>
+          </a:fontRef>
+        </p:style>
+        <p:txBody>
+          <a:bodyPr rtlCol="0" anchor="ctr"/>
+          <a:p>
+            <a:pPr algn="ctr"/>
+            <a:endParaRPr lang="zh-CN" altLang="en-US"/>
+          </a:p>
+        </p:txBody>
+      </p:sp>
+      <p:sp>
+        <p:nvSpPr>
+          <p:cNvPr id="16" name="文本框 15"/>
+          <p:cNvSpPr txBox="1"/>
+          <p:nvPr/>
+        </p:nvSpPr>
+        <p:spPr>
+          <a:xfrm>
+            <a:off x="1717675" y="3242945"/>
+            <a:ext cx="681990" cy="368300"/>
+          </a:xfrm>
+          <a:prstGeom prst="rect">
+            <a:avLst/>
+          </a:prstGeom>
+          <a:noFill/>
+        </p:spPr>
+        <p:txBody>
+          <a:bodyPr wrap="none" rtlCol="0">
+            <a:spAutoFit/>
+          </a:bodyPr>
+          <a:p>
+            <a:r>
+              <a:rPr lang="en-US" altLang="zh-CN"/>
+              <a:t>redis</a:t>
+            </a:r>
+            <a:endParaRPr lang="en-US" altLang="zh-CN"/>
+          </a:p>
+        </p:txBody>
+      </p:sp>
+      <p:sp>
+        <p:nvSpPr>
+          <p:cNvPr id="17" name="文本框 16"/>
+          <p:cNvSpPr txBox="1"/>
+          <p:nvPr/>
+        </p:nvSpPr>
+        <p:spPr>
+          <a:xfrm>
+            <a:off x="5998845" y="2613660"/>
+            <a:ext cx="2072640" cy="553720"/>
+          </a:xfrm>
+          <a:prstGeom prst="rect">
+            <a:avLst/>
+          </a:prstGeom>
+          <a:noFill/>
+        </p:spPr>
+        <p:txBody>
+          <a:bodyPr wrap="square" rtlCol="0">
+            <a:noAutofit/>
+          </a:bodyPr>
+          <a:p>
+            <a:r>
+              <a:rPr lang="en-US" altLang="zh-CN" b="1">
+                <a:solidFill>
+                  <a:srgbClr val="FF0000"/>
+                </a:solidFill>
+              </a:rPr>
+              <a:t>Jobor Server</a:t>
+            </a:r>
+            <a:endParaRPr lang="en-US" altLang="zh-CN" b="1">
+              <a:solidFill>
+                <a:srgbClr val="FF0000"/>
+              </a:solidFill>
+            </a:endParaRPr>
+          </a:p>
+        </p:txBody>
+      </p:sp>
+      <p:cxnSp>
+        <p:nvCxnSpPr>
+          <p:cNvPr id="25" name="直接箭头连接符 24"/>
+          <p:cNvCxnSpPr/>
+          <p:nvPr/>
+        </p:nvCxnSpPr>
+        <p:spPr>
+          <a:xfrm>
+            <a:off x="2546350" y="2308860"/>
+            <a:ext cx="1027430" cy="242570"/>
+          </a:xfrm>
+          <a:prstGeom prst="straightConnector1">
+            <a:avLst/>
+          </a:prstGeom>
+          <a:ln>
+            <a:headEnd type="arrow"/>
+            <a:tailEnd type="arrow"/>
+          </a:ln>
+        </p:spPr>
+        <p:style>
+          <a:lnRef idx="1">
+            <a:schemeClr val="accent1"/>
+          </a:lnRef>
+          <a:fillRef idx="0">
+            <a:schemeClr val="accent1"/>
+          </a:fillRef>
+          <a:effectRef idx="0">
+            <a:schemeClr val="accent1"/>
+          </a:effectRef>
+          <a:fontRef idx="minor">
+            <a:schemeClr val="tx1"/>
+          </a:fontRef>
+        </p:style>
+      </p:cxnSp>
+      <p:cxnSp>
+        <p:nvCxnSpPr>
+          <p:cNvPr id="26" name="直接箭头连接符 25"/>
+          <p:cNvCxnSpPr/>
+          <p:nvPr/>
+        </p:nvCxnSpPr>
+        <p:spPr>
+          <a:xfrm flipV="1">
+            <a:off x="2566670" y="3208655"/>
+            <a:ext cx="958215" cy="180340"/>
+          </a:xfrm>
+          <a:prstGeom prst="straightConnector1">
+            <a:avLst/>
+          </a:prstGeom>
+          <a:ln>
+            <a:headEnd type="arrow"/>
+            <a:tailEnd type="arrow"/>
+          </a:ln>
+        </p:spPr>
+        <p:style>
+          <a:lnRef idx="1">
+            <a:schemeClr val="accent1"/>
+          </a:lnRef>
+          <a:fillRef idx="0">
+            <a:schemeClr val="accent1"/>
+          </a:fillRef>
+          <a:effectRef idx="0">
+            <a:schemeClr val="accent1"/>
+          </a:effectRef>
+          <a:fontRef idx="minor">
+            <a:schemeClr val="tx1"/>
+          </a:fontRef>
+        </p:style>
+      </p:cxnSp>
+      <p:sp>
+        <p:nvSpPr>
+          <p:cNvPr id="27" name="文本框 26"/>
+          <p:cNvSpPr txBox="1"/>
+          <p:nvPr/>
+        </p:nvSpPr>
+        <p:spPr>
+          <a:xfrm>
+            <a:off x="6002020" y="1963420"/>
+            <a:ext cx="1558290" cy="368300"/>
+          </a:xfrm>
+          <a:prstGeom prst="rect">
+            <a:avLst/>
+          </a:prstGeom>
+          <a:noFill/>
+        </p:spPr>
+        <p:txBody>
+          <a:bodyPr wrap="none" rtlCol="0">
+            <a:spAutoFit/>
+          </a:bodyPr>
+          <a:p>
+            <a:r>
+              <a:rPr lang="zh-CN" altLang="en-US" b="1"/>
+              <a:t>调度服务集群</a:t>
+            </a:r>
+            <a:endParaRPr lang="zh-CN" altLang="en-US" b="1"/>
+          </a:p>
+        </p:txBody>
+      </p:sp>
+      <p:sp>
+        <p:nvSpPr>
+          <p:cNvPr id="28" name="文本框 27"/>
+          <p:cNvSpPr txBox="1"/>
+          <p:nvPr/>
+        </p:nvSpPr>
+        <p:spPr>
+          <a:xfrm>
+            <a:off x="3296285" y="5143500"/>
+            <a:ext cx="1130935" cy="368300"/>
+          </a:xfrm>
+          <a:prstGeom prst="rect">
+            <a:avLst/>
+          </a:prstGeom>
+          <a:noFill/>
+        </p:spPr>
+        <p:txBody>
+          <a:bodyPr wrap="none" rtlCol="0">
+            <a:spAutoFit/>
+          </a:bodyPr>
+          <a:p>
+            <a:r>
+              <a:rPr lang="en-US" altLang="zh-CN"/>
+              <a:t>Worker A</a:t>
+            </a:r>
+            <a:endParaRPr lang="en-US" altLang="zh-CN"/>
+          </a:p>
+        </p:txBody>
+      </p:sp>
+      <p:sp>
+        <p:nvSpPr>
+          <p:cNvPr id="29" name="圆角矩形 28"/>
+          <p:cNvSpPr/>
+          <p:nvPr/>
+        </p:nvSpPr>
+        <p:spPr>
+          <a:xfrm>
+            <a:off x="5085715" y="5050790"/>
+            <a:ext cx="1471930" cy="553720"/>
+          </a:xfrm>
+          <a:prstGeom prst="roundRect">
+            <a:avLst/>
+          </a:prstGeom>
+          <a:noFill/>
+          <a:ln>
+            <a:solidFill>
+              <a:schemeClr val="accent1"/>
+            </a:solidFill>
+          </a:ln>
+        </p:spPr>
+        <p:style>
+          <a:lnRef idx="2">
+            <a:schemeClr val="accent6"/>
+          </a:lnRef>
+          <a:fillRef idx="1">
+            <a:schemeClr val="lt1"/>
+          </a:fillRef>
+          <a:effectRef idx="0">
+            <a:schemeClr val="accent6"/>
+          </a:effectRef>
+          <a:fontRef idx="minor">
+            <a:schemeClr val="dk1"/>
+          </a:fontRef>
+        </p:style>
+        <p:txBody>
+          <a:bodyPr rtlCol="0" anchor="ctr"/>
+          <a:p>
+            <a:pPr algn="ctr"/>
+            <a:endParaRPr lang="zh-CN" altLang="en-US"/>
+          </a:p>
+        </p:txBody>
+      </p:sp>
+      <p:sp>
+        <p:nvSpPr>
+          <p:cNvPr id="30" name="文本框 29"/>
+          <p:cNvSpPr txBox="1"/>
+          <p:nvPr/>
+        </p:nvSpPr>
+        <p:spPr>
+          <a:xfrm>
+            <a:off x="5255895" y="5143500"/>
+            <a:ext cx="1139825" cy="368300"/>
+          </a:xfrm>
+          <a:prstGeom prst="rect">
+            <a:avLst/>
+          </a:prstGeom>
+          <a:noFill/>
+        </p:spPr>
+        <p:txBody>
+          <a:bodyPr wrap="none" rtlCol="0">
+            <a:spAutoFit/>
+          </a:bodyPr>
+          <a:p>
+            <a:r>
+              <a:rPr lang="en-US" altLang="zh-CN"/>
+              <a:t>Worker B</a:t>
+            </a:r>
+            <a:endParaRPr lang="en-US" altLang="zh-CN"/>
+          </a:p>
+        </p:txBody>
+      </p:sp>
+      <p:sp>
+        <p:nvSpPr>
+          <p:cNvPr id="31" name="圆角矩形 30"/>
+          <p:cNvSpPr/>
+          <p:nvPr/>
+        </p:nvSpPr>
+        <p:spPr>
+          <a:xfrm>
+            <a:off x="7053580" y="5050790"/>
+            <a:ext cx="1471930" cy="553720"/>
+          </a:xfrm>
+          <a:prstGeom prst="roundRect">
+            <a:avLst/>
+          </a:prstGeom>
+          <a:noFill/>
+          <a:ln>
+            <a:solidFill>
+              <a:schemeClr val="accent1"/>
+            </a:solidFill>
+          </a:ln>
+        </p:spPr>
+        <p:style>
+          <a:lnRef idx="2">
+            <a:schemeClr val="accent6"/>
+          </a:lnRef>
+          <a:fillRef idx="1">
+            <a:schemeClr val="lt1"/>
+          </a:fillRef>
+          <a:effectRef idx="0">
+            <a:schemeClr val="accent6"/>
+          </a:effectRef>
+          <a:fontRef idx="minor">
+            <a:schemeClr val="dk1"/>
+          </a:fontRef>
+        </p:style>
+        <p:txBody>
+          <a:bodyPr rtlCol="0" anchor="ctr"/>
+          <a:p>
+            <a:pPr algn="ctr"/>
+            <a:endParaRPr lang="zh-CN" altLang="en-US"/>
+          </a:p>
+        </p:txBody>
+      </p:sp>
+      <p:sp>
+        <p:nvSpPr>
+          <p:cNvPr id="32" name="文本框 31"/>
+          <p:cNvSpPr txBox="1"/>
+          <p:nvPr/>
+        </p:nvSpPr>
+        <p:spPr>
+          <a:xfrm>
+            <a:off x="7223760" y="5143500"/>
+            <a:ext cx="1148080" cy="368300"/>
+          </a:xfrm>
+          <a:prstGeom prst="rect">
+            <a:avLst/>
+          </a:prstGeom>
+          <a:noFill/>
+        </p:spPr>
+        <p:txBody>
+          <a:bodyPr wrap="none" rtlCol="0">
+            <a:spAutoFit/>
+          </a:bodyPr>
+          <a:p>
+            <a:r>
+              <a:rPr lang="en-US" altLang="zh-CN"/>
+              <a:t>Worker C</a:t>
+            </a:r>
+            <a:endParaRPr lang="en-US" altLang="zh-CN"/>
+          </a:p>
+        </p:txBody>
+      </p:sp>
+      <p:sp>
+        <p:nvSpPr>
+          <p:cNvPr id="33" name="圆角矩形 32"/>
+          <p:cNvSpPr/>
+          <p:nvPr/>
+        </p:nvSpPr>
+        <p:spPr>
+          <a:xfrm>
+            <a:off x="9020810" y="5040630"/>
+            <a:ext cx="1471930" cy="553720"/>
+          </a:xfrm>
+          <a:prstGeom prst="roundRect">
+            <a:avLst/>
+          </a:prstGeom>
+          <a:noFill/>
+          <a:ln>
+            <a:solidFill>
+              <a:schemeClr val="accent1"/>
+            </a:solidFill>
+          </a:ln>
+        </p:spPr>
+        <p:style>
+          <a:lnRef idx="2">
+            <a:schemeClr val="accent6"/>
+          </a:lnRef>
+          <a:fillRef idx="1">
+            <a:schemeClr val="lt1"/>
+          </a:fillRef>
+          <a:effectRef idx="0">
+            <a:schemeClr val="accent6"/>
+          </a:effectRef>
+          <a:fontRef idx="minor">
+            <a:schemeClr val="dk1"/>
+          </a:fontRef>
+        </p:style>
+        <p:txBody>
+          <a:bodyPr rtlCol="0" anchor="ctr"/>
+          <a:p>
+            <a:pPr algn="ctr"/>
+            <a:endParaRPr lang="zh-CN" altLang="en-US"/>
+          </a:p>
+        </p:txBody>
+      </p:sp>
+      <p:sp>
+        <p:nvSpPr>
+          <p:cNvPr id="34" name="文本框 33"/>
+          <p:cNvSpPr txBox="1"/>
+          <p:nvPr/>
+        </p:nvSpPr>
+        <p:spPr>
+          <a:xfrm>
+            <a:off x="9190990" y="5133340"/>
+            <a:ext cx="1148080" cy="368300"/>
+          </a:xfrm>
+          <a:prstGeom prst="rect">
+            <a:avLst/>
+          </a:prstGeom>
+          <a:noFill/>
+        </p:spPr>
+        <p:txBody>
+          <a:bodyPr wrap="none" rtlCol="0">
+            <a:spAutoFit/>
+          </a:bodyPr>
+          <a:p>
+            <a:r>
+              <a:rPr lang="en-US" altLang="zh-CN"/>
+              <a:t>Worker N</a:t>
+            </a:r>
+            <a:endParaRPr lang="en-US" altLang="zh-CN"/>
+          </a:p>
+        </p:txBody>
+      </p:sp>
+      <p:sp>
+        <p:nvSpPr>
+          <p:cNvPr id="35" name="圆角矩形 34"/>
+          <p:cNvSpPr/>
+          <p:nvPr/>
+        </p:nvSpPr>
+        <p:spPr>
+          <a:xfrm>
+            <a:off x="5905500" y="771525"/>
+            <a:ext cx="1765935" cy="570865"/>
+          </a:xfrm>
+          <a:prstGeom prst="roundRect">
+            <a:avLst/>
+          </a:prstGeom>
+          <a:noFill/>
+          <a:ln>
+            <a:solidFill>
+              <a:schemeClr val="accent1"/>
+            </a:solidFill>
+          </a:ln>
+        </p:spPr>
+        <p:style>
+          <a:lnRef idx="2">
+            <a:schemeClr val="accent6"/>
+          </a:lnRef>
+          <a:fillRef idx="1">
+            <a:schemeClr val="lt1"/>
+          </a:fillRef>
+          <a:effectRef idx="0">
+            <a:schemeClr val="accent6"/>
+          </a:effectRef>
+          <a:fontRef idx="minor">
+            <a:schemeClr val="dk1"/>
+          </a:fontRef>
+        </p:style>
+        <p:txBody>
+          <a:bodyPr rtlCol="0" anchor="ctr"/>
+          <a:p>
+            <a:pPr algn="ctr"/>
+            <a:endParaRPr lang="zh-CN" altLang="en-US"/>
+          </a:p>
+        </p:txBody>
+      </p:sp>
+      <p:sp>
+        <p:nvSpPr>
+          <p:cNvPr id="36" name="文本框 35"/>
+          <p:cNvSpPr txBox="1"/>
+          <p:nvPr/>
+        </p:nvSpPr>
+        <p:spPr>
+          <a:xfrm>
+            <a:off x="5989955" y="864235"/>
+            <a:ext cx="1596390" cy="368300"/>
+          </a:xfrm>
+          <a:prstGeom prst="rect">
+            <a:avLst/>
+          </a:prstGeom>
+          <a:noFill/>
+        </p:spPr>
+        <p:txBody>
+          <a:bodyPr wrap="none" rtlCol="0">
+            <a:spAutoFit/>
+          </a:bodyPr>
+          <a:p>
+            <a:r>
+              <a:rPr lang="en-US" altLang="zh-CN"/>
+              <a:t>Web</a:t>
+            </a:r>
+            <a:r>
+              <a:rPr lang="zh-CN" altLang="en-US"/>
+              <a:t>管理</a:t>
+            </a:r>
+            <a:r>
+              <a:rPr lang="en-US" altLang="zh-CN"/>
+              <a:t>Task</a:t>
+            </a:r>
+            <a:endParaRPr lang="en-US" altLang="zh-CN"/>
+          </a:p>
+        </p:txBody>
+      </p:sp>
+      <p:cxnSp>
+        <p:nvCxnSpPr>
+          <p:cNvPr id="37" name="直接箭头连接符 36"/>
+          <p:cNvCxnSpPr/>
+          <p:nvPr/>
+        </p:nvCxnSpPr>
+        <p:spPr>
+          <a:xfrm flipH="1">
+            <a:off x="3916680" y="3743325"/>
+            <a:ext cx="335280" cy="1300480"/>
+          </a:xfrm>
+          <a:prstGeom prst="straightConnector1">
+            <a:avLst/>
+          </a:prstGeom>
+          <a:ln w="12700" cmpd="sng">
+            <a:solidFill>
+              <a:schemeClr val="accent1">
+                <a:shade val="50000"/>
+              </a:schemeClr>
+            </a:solidFill>
+            <a:prstDash val="sysDot"/>
+            <a:headEnd type="none"/>
+            <a:tailEnd type="arrow"/>
+          </a:ln>
+        </p:spPr>
+        <p:style>
+          <a:lnRef idx="1">
+            <a:schemeClr val="accent1"/>
+          </a:lnRef>
+          <a:fillRef idx="0">
+            <a:schemeClr val="accent1"/>
+          </a:fillRef>
+          <a:effectRef idx="0">
+            <a:schemeClr val="accent1"/>
+          </a:effectRef>
+          <a:fontRef idx="minor">
+            <a:schemeClr val="tx1"/>
+          </a:fontRef>
+        </p:style>
+      </p:cxnSp>
+      <p:cxnSp>
+        <p:nvCxnSpPr>
+          <p:cNvPr id="39" name="直接箭头连接符 38"/>
+          <p:cNvCxnSpPr/>
+          <p:nvPr/>
+        </p:nvCxnSpPr>
+        <p:spPr>
+          <a:xfrm flipH="1">
+            <a:off x="5827395" y="3743325"/>
+            <a:ext cx="335280" cy="1300480"/>
+          </a:xfrm>
+          <a:prstGeom prst="straightConnector1">
+            <a:avLst/>
+          </a:prstGeom>
+          <a:ln w="12700" cmpd="sng">
+            <a:solidFill>
+              <a:schemeClr val="accent1">
+                <a:shade val="50000"/>
+              </a:schemeClr>
+            </a:solidFill>
+            <a:prstDash val="sysDot"/>
+            <a:headEnd type="none"/>
+            <a:tailEnd type="arrow"/>
+          </a:ln>
+        </p:spPr>
+        <p:style>
+          <a:lnRef idx="1">
+            <a:schemeClr val="accent1"/>
+          </a:lnRef>
+          <a:fillRef idx="0">
+            <a:schemeClr val="accent1"/>
+          </a:fillRef>
+          <a:effectRef idx="0">
+            <a:schemeClr val="accent1"/>
+          </a:effectRef>
+          <a:fontRef idx="minor">
+            <a:schemeClr val="tx1"/>
+          </a:fontRef>
+        </p:style>
+      </p:cxnSp>
+      <p:cxnSp>
+        <p:nvCxnSpPr>
+          <p:cNvPr id="40" name="直接箭头连接符 39"/>
+          <p:cNvCxnSpPr/>
+          <p:nvPr/>
+        </p:nvCxnSpPr>
+        <p:spPr>
+          <a:xfrm>
+            <a:off x="7450455" y="3750310"/>
+            <a:ext cx="282575" cy="1325880"/>
+          </a:xfrm>
+          <a:prstGeom prst="straightConnector1">
+            <a:avLst/>
+          </a:prstGeom>
+          <a:ln w="12700" cmpd="sng">
+            <a:solidFill>
+              <a:schemeClr val="accent1">
+                <a:shade val="50000"/>
+              </a:schemeClr>
+            </a:solidFill>
+            <a:prstDash val="sysDot"/>
+            <a:headEnd type="none"/>
+            <a:tailEnd type="arrow"/>
+          </a:ln>
+        </p:spPr>
+        <p:style>
+          <a:lnRef idx="1">
+            <a:schemeClr val="accent1"/>
+          </a:lnRef>
+          <a:fillRef idx="0">
+            <a:schemeClr val="accent1"/>
+          </a:fillRef>
+          <a:effectRef idx="0">
+            <a:schemeClr val="accent1"/>
+          </a:effectRef>
+          <a:fontRef idx="minor">
+            <a:schemeClr val="tx1"/>
+          </a:fontRef>
+        </p:style>
+      </p:cxnSp>
+      <p:cxnSp>
+        <p:nvCxnSpPr>
+          <p:cNvPr id="41" name="直接箭头连接符 40"/>
+          <p:cNvCxnSpPr/>
+          <p:nvPr/>
+        </p:nvCxnSpPr>
+        <p:spPr>
+          <a:xfrm>
+            <a:off x="9196070" y="3750310"/>
+            <a:ext cx="548640" cy="1316990"/>
+          </a:xfrm>
+          <a:prstGeom prst="straightConnector1">
+            <a:avLst/>
+          </a:prstGeom>
+          <a:ln w="12700" cmpd="sng">
+            <a:solidFill>
+              <a:schemeClr val="accent1">
+                <a:shade val="50000"/>
+              </a:schemeClr>
+            </a:solidFill>
+            <a:prstDash val="sysDot"/>
+            <a:headEnd type="none"/>
+            <a:tailEnd type="arrow"/>
+          </a:ln>
+        </p:spPr>
+        <p:style>
+          <a:lnRef idx="1">
+            <a:schemeClr val="accent1"/>
+          </a:lnRef>
+          <a:fillRef idx="0">
+            <a:schemeClr val="accent1"/>
+          </a:fillRef>
+          <a:effectRef idx="0">
+            <a:schemeClr val="accent1"/>
+          </a:effectRef>
+          <a:fontRef idx="minor">
+            <a:schemeClr val="tx1"/>
+          </a:fontRef>
+        </p:style>
+      </p:cxnSp>
+      <p:sp>
+        <p:nvSpPr>
+          <p:cNvPr id="42" name="文本框 41"/>
+          <p:cNvSpPr txBox="1"/>
+          <p:nvPr/>
+        </p:nvSpPr>
+        <p:spPr>
+          <a:xfrm rot="16200000">
+            <a:off x="3922395" y="4072255"/>
+            <a:ext cx="367030" cy="492125"/>
+          </a:xfrm>
+          <a:prstGeom prst="rect">
+            <a:avLst/>
+          </a:prstGeom>
+          <a:noFill/>
+        </p:spPr>
+        <p:txBody>
+          <a:bodyPr vert="eaVert" wrap="none" rtlCol="0">
+            <a:spAutoFit/>
+          </a:bodyPr>
+          <a:p>
+            <a:r>
+              <a:rPr lang="en-US" altLang="zh-CN" sz="1200"/>
+              <a:t>gRPC</a:t>
+            </a:r>
+            <a:endParaRPr lang="en-US" altLang="zh-CN" sz="1200"/>
+          </a:p>
+        </p:txBody>
+      </p:sp>
+      <p:sp>
+        <p:nvSpPr>
+          <p:cNvPr id="43" name="文本框 42"/>
+          <p:cNvSpPr txBox="1"/>
+          <p:nvPr/>
+        </p:nvSpPr>
+        <p:spPr>
+          <a:xfrm rot="16200000">
+            <a:off x="7385050" y="4193540"/>
+            <a:ext cx="367030" cy="492125"/>
+          </a:xfrm>
+          <a:prstGeom prst="rect">
+            <a:avLst/>
+          </a:prstGeom>
+          <a:noFill/>
+        </p:spPr>
+        <p:txBody>
+          <a:bodyPr vert="eaVert" wrap="none" rtlCol="0">
+            <a:spAutoFit/>
+          </a:bodyPr>
+          <a:p>
+            <a:r>
+              <a:rPr lang="en-US" altLang="zh-CN" sz="1200"/>
+              <a:t>gRPC</a:t>
+            </a:r>
+            <a:endParaRPr lang="en-US" altLang="zh-CN" sz="1200"/>
+          </a:p>
+        </p:txBody>
+      </p:sp>
+      <p:sp>
+        <p:nvSpPr>
+          <p:cNvPr id="44" name="文本框 43"/>
+          <p:cNvSpPr txBox="1"/>
+          <p:nvPr/>
+        </p:nvSpPr>
+        <p:spPr>
+          <a:xfrm rot="16200000">
+            <a:off x="5790565" y="4147185"/>
+            <a:ext cx="367030" cy="492125"/>
+          </a:xfrm>
+          <a:prstGeom prst="rect">
+            <a:avLst/>
+          </a:prstGeom>
+          <a:noFill/>
+        </p:spPr>
+        <p:txBody>
+          <a:bodyPr vert="eaVert" wrap="none" rtlCol="0">
+            <a:spAutoFit/>
+          </a:bodyPr>
+          <a:p>
+            <a:r>
+              <a:rPr lang="en-US" altLang="zh-CN" sz="1200"/>
+              <a:t>gRPC</a:t>
+            </a:r>
+            <a:endParaRPr lang="en-US" altLang="zh-CN" sz="1200"/>
+          </a:p>
+        </p:txBody>
+      </p:sp>
+      <p:sp>
+        <p:nvSpPr>
+          <p:cNvPr id="45" name="文本框 44"/>
+          <p:cNvSpPr txBox="1"/>
+          <p:nvPr/>
+        </p:nvSpPr>
+        <p:spPr>
+          <a:xfrm rot="16200000">
+            <a:off x="9357995" y="4188460"/>
+            <a:ext cx="367030" cy="492125"/>
+          </a:xfrm>
+          <a:prstGeom prst="rect">
+            <a:avLst/>
+          </a:prstGeom>
+          <a:noFill/>
+        </p:spPr>
+        <p:txBody>
+          <a:bodyPr vert="eaVert" wrap="none" rtlCol="0">
+            <a:spAutoFit/>
+          </a:bodyPr>
+          <a:p>
+            <a:r>
+              <a:rPr lang="en-US" altLang="zh-CN" sz="1200"/>
+              <a:t>gRPC</a:t>
+            </a:r>
+            <a:endParaRPr lang="en-US" altLang="zh-CN" sz="1200"/>
+          </a:p>
+        </p:txBody>
+      </p:sp>
+      <p:cxnSp>
+        <p:nvCxnSpPr>
+          <p:cNvPr id="46" name="直接箭头连接符 45"/>
+          <p:cNvCxnSpPr>
+            <a:stCxn id="35" idx="2"/>
+            <a:endCxn id="4" idx="0"/>
+          </p:cNvCxnSpPr>
+          <p:nvPr/>
+        </p:nvCxnSpPr>
+        <p:spPr>
+          <a:xfrm>
+            <a:off x="6788785" y="1342390"/>
+            <a:ext cx="12700" cy="597535"/>
+          </a:xfrm>
+          <a:prstGeom prst="straightConnector1">
+            <a:avLst/>
+          </a:prstGeom>
+          <a:ln w="12700" cmpd="sng">
+            <a:solidFill>
+              <a:schemeClr val="accent1">
+                <a:shade val="50000"/>
+              </a:schemeClr>
+            </a:solidFill>
+            <a:prstDash val="solid"/>
+            <a:headEnd type="none"/>
+            <a:tailEnd type="none"/>
+          </a:ln>
+        </p:spPr>
+        <p:style>
+          <a:lnRef idx="1">
+            <a:schemeClr val="accent1"/>
+          </a:lnRef>
+          <a:fillRef idx="0">
+            <a:schemeClr val="accent1"/>
+          </a:fillRef>
+          <a:effectRef idx="0">
+            <a:schemeClr val="accent1"/>
+          </a:effectRef>
+          <a:fontRef idx="minor">
+            <a:schemeClr val="tx1"/>
+          </a:fontRef>
+        </p:style>
+      </p:cxnSp>
+    </p:spTree>
+  </p:cSld>
+  <p:clrMapOvr>
+    <a:masterClrMapping/>
+  </p:clrMapOvr>
+</p:sld>
+</file>
+
+<file path=ppt/slides/slide2.xml><?xml version="1.0" encoding="utf-8"?>
+<p:sld xmlns:a="http://schemas.openxmlformats.org/drawingml/2006/main" xmlns:r="http://schemas.openxmlformats.org/officeDocument/2006/relationships" xmlns:p="http://schemas.openxmlformats.org/presentationml/2006/main">
+  <p:cSld>
+    <p:spTree>
+      <p:nvGrpSpPr>
+        <p:cNvPr id="1" name=""/>
+        <p:cNvGrpSpPr/>
+        <p:nvPr/>
+      </p:nvGrpSpPr>
+      <p:grpSpPr/>
+      <p:sp>
+        <p:nvSpPr>
+          <p:cNvPr id="4" name="圆角矩形 3"/>
+          <p:cNvSpPr/>
+          <p:nvPr/>
+        </p:nvSpPr>
+        <p:spPr>
+          <a:xfrm>
+            <a:off x="3571875" y="1939925"/>
+            <a:ext cx="6458585" cy="1795780"/>
+          </a:xfrm>
+          <a:prstGeom prst="roundRect">
+            <a:avLst/>
+          </a:prstGeom>
+          <a:noFill/>
+        </p:spPr>
+        <p:style>
+          <a:lnRef idx="2">
+            <a:schemeClr val="accent1">
+              <a:shade val="50000"/>
+            </a:schemeClr>
+          </a:lnRef>
+          <a:fillRef idx="1">
+            <a:schemeClr val="accent1"/>
+          </a:fillRef>
+          <a:effectRef idx="0">
+            <a:schemeClr val="accent1"/>
+          </a:effectRef>
+          <a:fontRef idx="minor">
+            <a:schemeClr val="lt1"/>
+          </a:fontRef>
+        </p:style>
+        <p:txBody>
+          <a:bodyPr rtlCol="0" anchor="ctr"/>
+          <a:p>
+            <a:pPr algn="ctr"/>
+            <a:endParaRPr lang="zh-CN" altLang="en-US"/>
+          </a:p>
+        </p:txBody>
+      </p:sp>
+      <p:sp>
+        <p:nvSpPr>
+          <p:cNvPr id="7" name="流程图: 磁盘 6"/>
+          <p:cNvSpPr/>
+          <p:nvPr/>
+        </p:nvSpPr>
+        <p:spPr>
+          <a:xfrm>
+            <a:off x="1605280" y="1939925"/>
+            <a:ext cx="914400" cy="611505"/>
+          </a:xfrm>
+          <a:prstGeom prst="flowChartMagneticDisk">
+            <a:avLst/>
+          </a:prstGeom>
+          <a:noFill/>
+          <a:extLst>
+            <a:ext uri="{909E8E84-426E-40DD-AFC4-6F175D3DCCD1}">
+              <a14:hiddenFill xmlns:a14="http://schemas.microsoft.com/office/drawing/2010/main">
+                <a:solidFill>
+                  <a:schemeClr val="accent1"/>
+                </a:solidFill>
+              </a14:hiddenFill>
+            </a:ext>
+          </a:extLst>
+        </p:spPr>
+        <p:style>
+          <a:lnRef idx="2">
+            <a:schemeClr val="accent1">
+              <a:shade val="50000"/>
+            </a:schemeClr>
+          </a:lnRef>
+          <a:fillRef idx="1">
+            <a:schemeClr val="accent1"/>
+          </a:fillRef>
+          <a:effectRef idx="0">
+            <a:schemeClr val="accent1"/>
+          </a:effectRef>
+          <a:fontRef idx="minor">
+            <a:schemeClr val="lt1"/>
+          </a:fontRef>
+        </p:style>
+        <p:txBody>
+          <a:bodyPr rtlCol="0" anchor="ctr"/>
+          <a:p>
+            <a:pPr algn="ctr"/>
+            <a:endParaRPr lang="zh-CN" altLang="en-US"/>
+          </a:p>
+        </p:txBody>
+      </p:sp>
+      <p:sp>
+        <p:nvSpPr>
           <p:cNvPr id="8" name="圆角矩形 7"/>
           <p:cNvSpPr/>
           <p:nvPr/>

</xml_diff>